<commit_message>
ppt on the fly
</commit_message>
<xml_diff>
--- a/DocumentService/Templates/inspection_report_template.pptx
+++ b/DocumentService/Templates/inspection_report_template.pptx
@@ -235,13 +235,13 @@
               <c:strCache>
                 <c:ptCount val="3"/>
                 <c:pt idx="0">
-                  <c:v>Total</c:v>
+                  <c:v>column1</c:v>
                 </c:pt>
                 <c:pt idx="1">
-                  <c:v>Accepted</c:v>
+                  <c:v>column2</c:v>
                 </c:pt>
                 <c:pt idx="2">
-                  <c:v>Rejected</c:v>
+                  <c:v>column3</c:v>
                 </c:pt>
               </c:strCache>
             </c:strRef>
@@ -347,13 +347,13 @@
               <c:strCache>
                 <c:ptCount val="3"/>
                 <c:pt idx="0">
-                  <c:v>Total</c:v>
+                  <c:v>column1</c:v>
                 </c:pt>
                 <c:pt idx="1">
-                  <c:v>Accepted</c:v>
+                  <c:v>column2</c:v>
                 </c:pt>
                 <c:pt idx="2">
-                  <c:v>Rejected</c:v>
+                  <c:v>column3</c:v>
                 </c:pt>
               </c:strCache>
             </c:strRef>
@@ -387,8 +387,8 @@
         </c:dLbls>
         <c:gapWidth val="219"/>
         <c:overlap val="100"/>
-        <c:axId val="-1086118160"/>
-        <c:axId val="-1086107824"/>
+        <c:axId val="363963792"/>
+        <c:axId val="363964880"/>
       </c:barChart>
       <c:lineChart>
         <c:grouping val="standard"/>
@@ -426,13 +426,13 @@
               <c:strCache>
                 <c:ptCount val="3"/>
                 <c:pt idx="0">
-                  <c:v>Total</c:v>
+                  <c:v>column1</c:v>
                 </c:pt>
                 <c:pt idx="1">
-                  <c:v>Accepted</c:v>
+                  <c:v>column2</c:v>
                 </c:pt>
                 <c:pt idx="2">
-                  <c:v>Rejected</c:v>
+                  <c:v>column3</c:v>
                 </c:pt>
               </c:strCache>
             </c:strRef>
@@ -487,13 +487,13 @@
               <c:strCache>
                 <c:ptCount val="3"/>
                 <c:pt idx="0">
-                  <c:v>Total</c:v>
+                  <c:v>column1</c:v>
                 </c:pt>
                 <c:pt idx="1">
-                  <c:v>Accepted</c:v>
+                  <c:v>column2</c:v>
                 </c:pt>
                 <c:pt idx="2">
-                  <c:v>Rejected</c:v>
+                  <c:v>column3</c:v>
                 </c:pt>
               </c:strCache>
             </c:strRef>
@@ -525,11 +525,11 @@
         </c:dLbls>
         <c:marker val="1"/>
         <c:smooth val="0"/>
-        <c:axId val="-1086118160"/>
-        <c:axId val="-1086107824"/>
+        <c:axId val="363963792"/>
+        <c:axId val="363964880"/>
       </c:lineChart>
       <c:catAx>
-        <c:axId val="-1086118160"/>
+        <c:axId val="363963792"/>
         <c:scaling>
           <c:orientation val="minMax"/>
         </c:scaling>
@@ -572,7 +572,7 @@
             <a:endParaRPr lang="en-US"/>
           </a:p>
         </c:txPr>
-        <c:crossAx val="-1086107824"/>
+        <c:crossAx val="363964880"/>
         <c:crosses val="autoZero"/>
         <c:auto val="1"/>
         <c:lblAlgn val="ctr"/>
@@ -580,7 +580,7 @@
         <c:noMultiLvlLbl val="0"/>
       </c:catAx>
       <c:valAx>
-        <c:axId val="-1086107824"/>
+        <c:axId val="363964880"/>
         <c:scaling>
           <c:orientation val="minMax"/>
         </c:scaling>
@@ -622,7 +622,7 @@
             <a:endParaRPr lang="en-US"/>
           </a:p>
         </c:txPr>
-        <c:crossAx val="-1086118160"/>
+        <c:crossAx val="363963792"/>
         <c:crosses val="autoZero"/>
         <c:crossBetween val="between"/>
       </c:valAx>
@@ -1339,7 +1339,7 @@
           <a:p>
             <a:fld id="{4EA26BC4-93C1-488D-9451-CED3D03B4D31}" type="datetimeFigureOut">
               <a:rPr lang="en-US" smtClean="0"/>
-              <a:t>3/2/2018</a:t>
+              <a:t>3/3/2018</a:t>
             </a:fld>
             <a:endParaRPr lang="en-US"/>
           </a:p>
@@ -1516,7 +1516,7 @@
           <a:p>
             <a:fld id="{4EA26BC4-93C1-488D-9451-CED3D03B4D31}" type="datetimeFigureOut">
               <a:rPr lang="en-US" smtClean="0"/>
-              <a:t>3/2/2018</a:t>
+              <a:t>3/3/2018</a:t>
             </a:fld>
             <a:endParaRPr lang="en-US"/>
           </a:p>
@@ -1703,7 +1703,7 @@
           <a:p>
             <a:fld id="{4EA26BC4-93C1-488D-9451-CED3D03B4D31}" type="datetimeFigureOut">
               <a:rPr lang="en-US" smtClean="0"/>
-              <a:t>3/2/2018</a:t>
+              <a:t>3/3/2018</a:t>
             </a:fld>
             <a:endParaRPr lang="en-US"/>
           </a:p>
@@ -5536,7 +5536,7 @@
           <a:p>
             <a:fld id="{4EA26BC4-93C1-488D-9451-CED3D03B4D31}" type="datetimeFigureOut">
               <a:rPr lang="en-US" smtClean="0"/>
-              <a:t>3/2/2018</a:t>
+              <a:t>3/3/2018</a:t>
             </a:fld>
             <a:endParaRPr lang="en-US"/>
           </a:p>
@@ -6167,7 +6167,7 @@
           <a:p>
             <a:fld id="{4EA26BC4-93C1-488D-9451-CED3D03B4D31}" type="datetimeFigureOut">
               <a:rPr lang="en-US" smtClean="0"/>
-              <a:t>3/2/2018</a:t>
+              <a:t>3/3/2018</a:t>
             </a:fld>
             <a:endParaRPr lang="en-US"/>
           </a:p>
@@ -6406,7 +6406,7 @@
           <a:p>
             <a:fld id="{4EA26BC4-93C1-488D-9451-CED3D03B4D31}" type="datetimeFigureOut">
               <a:rPr lang="en-US" smtClean="0"/>
-              <a:t>3/2/2018</a:t>
+              <a:t>3/3/2018</a:t>
             </a:fld>
             <a:endParaRPr lang="en-US"/>
           </a:p>
@@ -6780,7 +6780,7 @@
           <a:p>
             <a:fld id="{4EA26BC4-93C1-488D-9451-CED3D03B4D31}" type="datetimeFigureOut">
               <a:rPr lang="en-US" smtClean="0"/>
-              <a:t>3/2/2018</a:t>
+              <a:t>3/3/2018</a:t>
             </a:fld>
             <a:endParaRPr lang="en-US"/>
           </a:p>
@@ -6905,7 +6905,7 @@
           <a:p>
             <a:fld id="{4EA26BC4-93C1-488D-9451-CED3D03B4D31}" type="datetimeFigureOut">
               <a:rPr lang="en-US" smtClean="0"/>
-              <a:t>3/2/2018</a:t>
+              <a:t>3/3/2018</a:t>
             </a:fld>
             <a:endParaRPr lang="en-US"/>
           </a:p>
@@ -7007,7 +7007,7 @@
           <a:p>
             <a:fld id="{4EA26BC4-93C1-488D-9451-CED3D03B4D31}" type="datetimeFigureOut">
               <a:rPr lang="en-US" smtClean="0"/>
-              <a:t>3/2/2018</a:t>
+              <a:t>3/3/2018</a:t>
             </a:fld>
             <a:endParaRPr lang="en-US"/>
           </a:p>
@@ -7291,7 +7291,7 @@
           <a:p>
             <a:fld id="{4EA26BC4-93C1-488D-9451-CED3D03B4D31}" type="datetimeFigureOut">
               <a:rPr lang="en-US" smtClean="0"/>
-              <a:t>3/2/2018</a:t>
+              <a:t>3/3/2018</a:t>
             </a:fld>
             <a:endParaRPr lang="en-US"/>
           </a:p>
@@ -7551,7 +7551,7 @@
           <a:p>
             <a:fld id="{4EA26BC4-93C1-488D-9451-CED3D03B4D31}" type="datetimeFigureOut">
               <a:rPr lang="en-US" smtClean="0"/>
-              <a:t>3/2/2018</a:t>
+              <a:t>3/3/2018</a:t>
             </a:fld>
             <a:endParaRPr lang="en-US"/>
           </a:p>
@@ -7771,7 +7771,7 @@
           <a:p>
             <a:fld id="{4EA26BC4-93C1-488D-9451-CED3D03B4D31}" type="datetimeFigureOut">
               <a:rPr lang="en-US" smtClean="0"/>
-              <a:t>3/2/2018</a:t>
+              <a:t>3/3/2018</a:t>
             </a:fld>
             <a:endParaRPr lang="en-US"/>
           </a:p>
@@ -9315,7 +9315,7 @@
           <p:nvPr>
             <p:extLst>
               <p:ext uri="{D42A27DB-BD31-4B8C-83A1-F6EECF244321}">
-                <p14:modId xmlns:p14="http://schemas.microsoft.com/office/powerpoint/2010/main" val="2580812458"/>
+                <p14:modId xmlns:p14="http://schemas.microsoft.com/office/powerpoint/2010/main" val="3907177449"/>
               </p:ext>
             </p:extLst>
           </p:nvPr>
@@ -9354,14 +9354,28 @@
           <a:p>
             <a:r>
               <a:rPr lang="en-US" dirty="0" smtClean="0"/>
-              <a:t>	Total</a:t>
-            </a:r>
-          </a:p>
-          <a:p>
+              <a:t>	</a:t>
+            </a:r>
+            <a:r>
+              <a:rPr lang="en-US" dirty="0"/>
+              <a:t>c</a:t>
+            </a:r>
             <a:r>
               <a:rPr lang="en-US" dirty="0" smtClean="0"/>
-              <a:t>	Accepted</a:t>
-            </a:r>
+              <a:t>olumn1</a:t>
+            </a:r>
+            <a:endParaRPr lang="en-US" dirty="0" smtClean="0"/>
+          </a:p>
+          <a:p>
+            <a:r>
+              <a:rPr lang="en-US" dirty="0" smtClean="0"/>
+              <a:t>	</a:t>
+            </a:r>
+            <a:r>
+              <a:rPr lang="en-US" dirty="0" smtClean="0"/>
+              <a:t>column2</a:t>
+            </a:r>
+            <a:endParaRPr lang="en-US" dirty="0" smtClean="0"/>
           </a:p>
           <a:p>
             <a:r>
@@ -9370,7 +9384,7 @@
             </a:r>
             <a:r>
               <a:rPr lang="en-US" dirty="0" smtClean="0"/>
-              <a:t>Rejected</a:t>
+              <a:t>column3</a:t>
             </a:r>
             <a:endParaRPr lang="en-US" dirty="0"/>
           </a:p>

</xml_diff>

<commit_message>
Rajagopal: Vendor and ins chart
</commit_message>
<xml_diff>
--- a/DocumentService/Templates/inspection_report_template.pptx
+++ b/DocumentService/Templates/inspection_report_template.pptx
@@ -387,8 +387,8 @@
         </c:dLbls>
         <c:gapWidth val="219"/>
         <c:overlap val="100"/>
-        <c:axId val="363963792"/>
-        <c:axId val="363964880"/>
+        <c:axId val="-1791314400"/>
+        <c:axId val="-1791326912"/>
       </c:barChart>
       <c:lineChart>
         <c:grouping val="standard"/>
@@ -525,11 +525,11 @@
         </c:dLbls>
         <c:marker val="1"/>
         <c:smooth val="0"/>
-        <c:axId val="363963792"/>
-        <c:axId val="363964880"/>
+        <c:axId val="-1791314400"/>
+        <c:axId val="-1791326912"/>
       </c:lineChart>
       <c:catAx>
-        <c:axId val="363963792"/>
+        <c:axId val="-1791314400"/>
         <c:scaling>
           <c:orientation val="minMax"/>
         </c:scaling>
@@ -572,7 +572,7 @@
             <a:endParaRPr lang="en-US"/>
           </a:p>
         </c:txPr>
-        <c:crossAx val="363964880"/>
+        <c:crossAx val="-1791326912"/>
         <c:crosses val="autoZero"/>
         <c:auto val="1"/>
         <c:lblAlgn val="ctr"/>
@@ -580,7 +580,7 @@
         <c:noMultiLvlLbl val="0"/>
       </c:catAx>
       <c:valAx>
-        <c:axId val="363964880"/>
+        <c:axId val="-1791326912"/>
         <c:scaling>
           <c:orientation val="minMax"/>
         </c:scaling>
@@ -622,7 +622,7 @@
             <a:endParaRPr lang="en-US"/>
           </a:p>
         </c:txPr>
-        <c:crossAx val="363963792"/>
+        <c:crossAx val="-1791314400"/>
         <c:crosses val="autoZero"/>
         <c:crossBetween val="between"/>
       </c:valAx>
@@ -9315,14 +9315,14 @@
           <p:nvPr>
             <p:extLst>
               <p:ext uri="{D42A27DB-BD31-4B8C-83A1-F6EECF244321}">
-                <p14:modId xmlns:p14="http://schemas.microsoft.com/office/powerpoint/2010/main" val="3907177449"/>
+                <p14:modId xmlns:p14="http://schemas.microsoft.com/office/powerpoint/2010/main" val="3311380614"/>
               </p:ext>
             </p:extLst>
           </p:nvPr>
         </p:nvGraphicFramePr>
         <p:xfrm>
           <a:off x="2032000" y="719667"/>
-          <a:ext cx="5662579" cy="3930154"/>
+          <a:ext cx="8117840" cy="3774706"/>
         </p:xfrm>
         <a:graphic>
           <a:graphicData uri="http://schemas.openxmlformats.org/drawingml/2006/chart">
@@ -9338,7 +9338,7 @@
         </p:nvSpPr>
         <p:spPr>
           <a:xfrm>
-            <a:off x="2368296" y="4608770"/>
+            <a:off x="2368296" y="4590482"/>
             <a:ext cx="5326283" cy="923330"/>
           </a:xfrm>
           <a:prstGeom prst="rect">
@@ -9364,18 +9364,12 @@
               <a:rPr lang="en-US" dirty="0" smtClean="0"/>
               <a:t>olumn1</a:t>
             </a:r>
-            <a:endParaRPr lang="en-US" dirty="0" smtClean="0"/>
           </a:p>
           <a:p>
             <a:r>
               <a:rPr lang="en-US" dirty="0" smtClean="0"/>
-              <a:t>	</a:t>
-            </a:r>
-            <a:r>
-              <a:rPr lang="en-US" dirty="0" smtClean="0"/>
-              <a:t>column2</a:t>
-            </a:r>
-            <a:endParaRPr lang="en-US" dirty="0" smtClean="0"/>
+              <a:t>	column2</a:t>
+            </a:r>
           </a:p>
           <a:p>
             <a:r>

</xml_diff>